<commit_message>
Updated for SQL Saturday Columbus
</commit_message>
<xml_diff>
--- a/Microsoft Fabric/Data - The Fabric Of Our Lives/20230715 - SQL Saturday Columbus - Data - The Fabric Of Our Lives.pptx
+++ b/Microsoft Fabric/Data - The Fabric Of Our Lives/20230715 - SQL Saturday Columbus - Data - The Fabric Of Our Lives.pptx
@@ -137,6 +137,15 @@
     </p:ext>
   </p:extLst>
 </p:presentation>
+</file>
+
+<file path=ppt/revisionInfo.xml><?xml version="1.0" encoding="utf-8"?>
+<p1510:revInfo xmlns:a="http://schemas.openxmlformats.org/drawingml/2006/main" xmlns:r="http://schemas.openxmlformats.org/officeDocument/2006/relationships" xmlns:p1510="http://schemas.microsoft.com/office/powerpoint/2015/10/main">
+  <p1510:revLst>
+    <p1510:client id="{CF8465D3-AAB6-4CFA-8EC9-533CC9B8970E}" v="12" dt="2023-07-15T12:13:47.164"/>
+    <p1510:client id="{ED1F197A-5E72-4051-89EB-401A16FF6143}" v="43" dt="2023-07-15T13:18:24.668"/>
+  </p1510:revLst>
+</p1510:revInfo>
 </file>
 
 <file path=ppt/slideLayouts/slideLayout1.xml><?xml version="1.0" encoding="utf-8"?>
@@ -885,7 +894,7 @@
             <a:fld id="{B61BEF0D-F0BB-DE4B-95CE-6DB70DBA9567}" type="datetimeFigureOut">
               <a:rPr lang="en-US" dirty="0"/>
               <a:pPr/>
-              <a:t>7/7/2023</a:t>
+              <a:t>7/15/2023</a:t>
             </a:fld>
             <a:endParaRPr lang="en-US" dirty="0"/>
           </a:p>
@@ -1133,7 +1142,7 @@
             <a:fld id="{B61BEF0D-F0BB-DE4B-95CE-6DB70DBA9567}" type="datetimeFigureOut">
               <a:rPr lang="en-US" dirty="0"/>
               <a:pPr/>
-              <a:t>7/7/2023</a:t>
+              <a:t>7/15/2023</a:t>
             </a:fld>
             <a:endParaRPr lang="en-US" dirty="0"/>
           </a:p>
@@ -1444,7 +1453,7 @@
             <a:fld id="{B61BEF0D-F0BB-DE4B-95CE-6DB70DBA9567}" type="datetimeFigureOut">
               <a:rPr lang="en-US" dirty="0"/>
               <a:pPr/>
-              <a:t>7/7/2023</a:t>
+              <a:t>7/15/2023</a:t>
             </a:fld>
             <a:endParaRPr lang="en-US" dirty="0"/>
           </a:p>
@@ -1774,7 +1783,7 @@
             <a:fld id="{B61BEF0D-F0BB-DE4B-95CE-6DB70DBA9567}" type="datetimeFigureOut">
               <a:rPr lang="en-US" dirty="0"/>
               <a:pPr/>
-              <a:t>7/7/2023</a:t>
+              <a:t>7/15/2023</a:t>
             </a:fld>
             <a:endParaRPr lang="en-US" dirty="0"/>
           </a:p>
@@ -2085,7 +2094,7 @@
             <a:fld id="{B61BEF0D-F0BB-DE4B-95CE-6DB70DBA9567}" type="datetimeFigureOut">
               <a:rPr lang="en-US" dirty="0"/>
               <a:pPr/>
-              <a:t>7/7/2023</a:t>
+              <a:t>7/15/2023</a:t>
             </a:fld>
             <a:endParaRPr lang="en-US" dirty="0"/>
           </a:p>
@@ -2475,7 +2484,7 @@
             <a:fld id="{B61BEF0D-F0BB-DE4B-95CE-6DB70DBA9567}" type="datetimeFigureOut">
               <a:rPr lang="en-US" dirty="0"/>
               <a:pPr/>
-              <a:t>7/7/2023</a:t>
+              <a:t>7/15/2023</a:t>
             </a:fld>
             <a:endParaRPr lang="en-US" dirty="0"/>
           </a:p>
@@ -2641,7 +2650,7 @@
           <a:p>
             <a:fld id="{55C6B4A9-1611-4792-9094-5F34BCA07E0B}" type="datetimeFigureOut">
               <a:rPr lang="en-US" dirty="0"/>
-              <a:t>7/7/2023</a:t>
+              <a:t>7/15/2023</a:t>
             </a:fld>
             <a:endParaRPr lang="en-US" dirty="0"/>
           </a:p>
@@ -2817,7 +2826,7 @@
             <a:fld id="{B61BEF0D-F0BB-DE4B-95CE-6DB70DBA9567}" type="datetimeFigureOut">
               <a:rPr lang="en-US" dirty="0"/>
               <a:pPr/>
-              <a:t>7/7/2023</a:t>
+              <a:t>7/15/2023</a:t>
             </a:fld>
             <a:endParaRPr lang="en-US" dirty="0"/>
           </a:p>
@@ -2983,7 +2992,7 @@
           <a:p>
             <a:fld id="{42A54C80-263E-416B-A8E0-580EDEADCBDC}" type="datetimeFigureOut">
               <a:rPr lang="en-US" dirty="0"/>
-              <a:t>7/7/2023</a:t>
+              <a:t>7/15/2023</a:t>
             </a:fld>
             <a:endParaRPr lang="en-US" dirty="0"/>
           </a:p>
@@ -3226,7 +3235,7 @@
             <a:fld id="{B61BEF0D-F0BB-DE4B-95CE-6DB70DBA9567}" type="datetimeFigureOut">
               <a:rPr lang="en-US" dirty="0"/>
               <a:pPr/>
-              <a:t>7/7/2023</a:t>
+              <a:t>7/15/2023</a:t>
             </a:fld>
             <a:endParaRPr lang="en-US" dirty="0"/>
           </a:p>
@@ -3454,7 +3463,7 @@
           <a:p>
             <a:fld id="{42A54C80-263E-416B-A8E0-580EDEADCBDC}" type="datetimeFigureOut">
               <a:rPr lang="en-US" dirty="0"/>
-              <a:t>7/7/2023</a:t>
+              <a:t>7/15/2023</a:t>
             </a:fld>
             <a:endParaRPr lang="en-US" dirty="0"/>
           </a:p>
@@ -3824,7 +3833,7 @@
             <a:fld id="{B61BEF0D-F0BB-DE4B-95CE-6DB70DBA9567}" type="datetimeFigureOut">
               <a:rPr lang="en-US" dirty="0"/>
               <a:pPr/>
-              <a:t>7/7/2023</a:t>
+              <a:t>7/15/2023</a:t>
             </a:fld>
             <a:endParaRPr lang="en-US" dirty="0"/>
           </a:p>
@@ -3944,7 +3953,7 @@
             <a:fld id="{B61BEF0D-F0BB-DE4B-95CE-6DB70DBA9567}" type="datetimeFigureOut">
               <a:rPr lang="en-US" dirty="0"/>
               <a:pPr/>
-              <a:t>7/7/2023</a:t>
+              <a:t>7/15/2023</a:t>
             </a:fld>
             <a:endParaRPr lang="en-US" dirty="0"/>
           </a:p>
@@ -4036,7 +4045,7 @@
             <a:fld id="{B61BEF0D-F0BB-DE4B-95CE-6DB70DBA9567}" type="datetimeFigureOut">
               <a:rPr lang="en-US" dirty="0"/>
               <a:pPr/>
-              <a:t>7/7/2023</a:t>
+              <a:t>7/15/2023</a:t>
             </a:fld>
             <a:endParaRPr lang="en-US" dirty="0"/>
           </a:p>
@@ -4287,7 +4296,7 @@
           <a:p>
             <a:fld id="{42A54C80-263E-416B-A8E0-580EDEADCBDC}" type="datetimeFigureOut">
               <a:rPr lang="en-US" dirty="0"/>
-              <a:t>7/7/2023</a:t>
+              <a:t>7/15/2023</a:t>
             </a:fld>
             <a:endParaRPr lang="en-US" dirty="0"/>
           </a:p>
@@ -4589,7 +4598,7 @@
             <a:fld id="{B61BEF0D-F0BB-DE4B-95CE-6DB70DBA9567}" type="datetimeFigureOut">
               <a:rPr lang="en-US" dirty="0"/>
               <a:pPr/>
-              <a:t>7/7/2023</a:t>
+              <a:t>7/15/2023</a:t>
             </a:fld>
             <a:endParaRPr lang="en-US" dirty="0"/>
           </a:p>
@@ -5287,7 +5296,7 @@
             <a:fld id="{B61BEF0D-F0BB-DE4B-95CE-6DB70DBA9567}" type="datetimeFigureOut">
               <a:rPr lang="en-US" dirty="0"/>
               <a:pPr/>
-              <a:t>7/7/2023</a:t>
+              <a:t>7/15/2023</a:t>
             </a:fld>
             <a:endParaRPr lang="en-US" dirty="0"/>
           </a:p>
@@ -5886,7 +5895,7 @@
             <a:pPr algn="ctr"/>
             <a:r>
               <a:rPr lang="en-US" sz="2800" dirty="0"/>
-              <a:t>ABQSQL – July 2023</a:t>
+              <a:t>SQL Saturday Columbus – July 15, 2023</a:t>
             </a:r>
           </a:p>
         </p:txBody>
@@ -6110,7 +6119,7 @@
             <a:pPr algn="l"/>
             <a:r>
               <a:rPr lang="en-US" sz="2400" dirty="0"/>
-              <a:t>Full compatibility with Azure Data Lake Storage Gen2</a:t>
+              <a:t>Proposed by Databricks in whitepapers in 2020/2021</a:t>
             </a:r>
           </a:p>
           <a:p>
@@ -6121,27 +6130,20 @@
             <a:pPr algn="l"/>
             <a:r>
               <a:rPr lang="en-US" sz="2400" dirty="0"/>
-              <a:t>Shortcut feature allows data virtualization across other ADLSg2, Amazon S3, and </a:t>
-            </a:r>
-            <a:r>
-              <a:rPr lang="en-US" sz="2400" dirty="0" err="1"/>
-              <a:t>Googe</a:t>
-            </a:r>
+              <a:t>10 key features</a:t>
+            </a:r>
+          </a:p>
+          <a:p>
+            <a:pPr algn="l"/>
+            <a:endParaRPr lang="en-US" sz="2400" dirty="0"/>
+          </a:p>
+          <a:p>
+            <a:pPr algn="l"/>
             <a:r>
               <a:rPr lang="en-US" sz="2400" dirty="0"/>
-              <a:t> Storage</a:t>
-            </a:r>
-          </a:p>
-          <a:p>
-            <a:pPr algn="l"/>
-            <a:endParaRPr lang="en-US" sz="2400" dirty="0"/>
-          </a:p>
-          <a:p>
-            <a:pPr algn="l"/>
-            <a:r>
-              <a:rPr lang="en-US" sz="2400" dirty="0"/>
-              <a:t>Data stored in the open-source Delta Parquet format</a:t>
-            </a:r>
+              <a:t>Often organized in medallion architecture</a:t>
+            </a:r>
+            <a:endParaRPr lang="en-US" dirty="0"/>
           </a:p>
         </p:txBody>
       </p:sp>

</xml_diff>